<commit_message>
added a test for app_info
</commit_message>
<xml_diff>
--- a/resources/images.pptx
+++ b/resources/images.pptx
@@ -6,6 +6,7 @@
   </p:sldMasterIdLst>
   <p:sldIdLst>
     <p:sldId id="256" r:id="rId2"/>
+    <p:sldId id="257" r:id="rId3"/>
   </p:sldIdLst>
   <p:sldSz cx="9144000" cy="6858000" type="screen4x3"/>
   <p:notesSz cx="6858000" cy="9144000"/>
@@ -104,6 +105,11 @@
       </a:defRPr>
     </a:lvl9pPr>
   </p:defaultTextStyle>
+  <p:extLst>
+    <p:ext uri="{EFAFB233-063F-42B5-8137-9DF3F51BA10A}">
+      <p15:sldGuideLst xmlns:p15="http://schemas.microsoft.com/office/powerpoint/2012/main"/>
+    </p:ext>
+  </p:extLst>
 </p:presentation>
 </file>
 
@@ -254,7 +260,7 @@
           <a:p>
             <a:fld id="{21B00427-3F2A-4FF0-A50F-39B79BD1214F}" type="datetimeFigureOut">
               <a:rPr lang="en-US" smtClean="0"/>
-              <a:t>3/3/2019</a:t>
+              <a:t>3/5/2019</a:t>
             </a:fld>
             <a:endParaRPr lang="en-US"/>
           </a:p>
@@ -452,7 +458,7 @@
           <a:p>
             <a:fld id="{21B00427-3F2A-4FF0-A50F-39B79BD1214F}" type="datetimeFigureOut">
               <a:rPr lang="en-US" smtClean="0"/>
-              <a:t>3/3/2019</a:t>
+              <a:t>3/5/2019</a:t>
             </a:fld>
             <a:endParaRPr lang="en-US"/>
           </a:p>
@@ -660,7 +666,7 @@
           <a:p>
             <a:fld id="{21B00427-3F2A-4FF0-A50F-39B79BD1214F}" type="datetimeFigureOut">
               <a:rPr lang="en-US" smtClean="0"/>
-              <a:t>3/3/2019</a:t>
+              <a:t>3/5/2019</a:t>
             </a:fld>
             <a:endParaRPr lang="en-US"/>
           </a:p>
@@ -858,7 +864,7 @@
           <a:p>
             <a:fld id="{21B00427-3F2A-4FF0-A50F-39B79BD1214F}" type="datetimeFigureOut">
               <a:rPr lang="en-US" smtClean="0"/>
-              <a:t>3/3/2019</a:t>
+              <a:t>3/5/2019</a:t>
             </a:fld>
             <a:endParaRPr lang="en-US"/>
           </a:p>
@@ -1133,7 +1139,7 @@
           <a:p>
             <a:fld id="{21B00427-3F2A-4FF0-A50F-39B79BD1214F}" type="datetimeFigureOut">
               <a:rPr lang="en-US" smtClean="0"/>
-              <a:t>3/3/2019</a:t>
+              <a:t>3/5/2019</a:t>
             </a:fld>
             <a:endParaRPr lang="en-US"/>
           </a:p>
@@ -1398,7 +1404,7 @@
           <a:p>
             <a:fld id="{21B00427-3F2A-4FF0-A50F-39B79BD1214F}" type="datetimeFigureOut">
               <a:rPr lang="en-US" smtClean="0"/>
-              <a:t>3/3/2019</a:t>
+              <a:t>3/5/2019</a:t>
             </a:fld>
             <a:endParaRPr lang="en-US"/>
           </a:p>
@@ -1810,7 +1816,7 @@
           <a:p>
             <a:fld id="{21B00427-3F2A-4FF0-A50F-39B79BD1214F}" type="datetimeFigureOut">
               <a:rPr lang="en-US" smtClean="0"/>
-              <a:t>3/3/2019</a:t>
+              <a:t>3/5/2019</a:t>
             </a:fld>
             <a:endParaRPr lang="en-US"/>
           </a:p>
@@ -1951,7 +1957,7 @@
           <a:p>
             <a:fld id="{21B00427-3F2A-4FF0-A50F-39B79BD1214F}" type="datetimeFigureOut">
               <a:rPr lang="en-US" smtClean="0"/>
-              <a:t>3/3/2019</a:t>
+              <a:t>3/5/2019</a:t>
             </a:fld>
             <a:endParaRPr lang="en-US"/>
           </a:p>
@@ -2064,7 +2070,7 @@
           <a:p>
             <a:fld id="{21B00427-3F2A-4FF0-A50F-39B79BD1214F}" type="datetimeFigureOut">
               <a:rPr lang="en-US" smtClean="0"/>
-              <a:t>3/3/2019</a:t>
+              <a:t>3/5/2019</a:t>
             </a:fld>
             <a:endParaRPr lang="en-US"/>
           </a:p>
@@ -2375,7 +2381,7 @@
           <a:p>
             <a:fld id="{21B00427-3F2A-4FF0-A50F-39B79BD1214F}" type="datetimeFigureOut">
               <a:rPr lang="en-US" smtClean="0"/>
-              <a:t>3/3/2019</a:t>
+              <a:t>3/5/2019</a:t>
             </a:fld>
             <a:endParaRPr lang="en-US"/>
           </a:p>
@@ -2663,7 +2669,7 @@
           <a:p>
             <a:fld id="{21B00427-3F2A-4FF0-A50F-39B79BD1214F}" type="datetimeFigureOut">
               <a:rPr lang="en-US" smtClean="0"/>
-              <a:t>3/3/2019</a:t>
+              <a:t>3/5/2019</a:t>
             </a:fld>
             <a:endParaRPr lang="en-US"/>
           </a:p>
@@ -2904,7 +2910,7 @@
           <a:p>
             <a:fld id="{21B00427-3F2A-4FF0-A50F-39B79BD1214F}" type="datetimeFigureOut">
               <a:rPr lang="en-US" smtClean="0"/>
-              <a:t>3/3/2019</a:t>
+              <a:t>3/5/2019</a:t>
             </a:fld>
             <a:endParaRPr lang="en-US"/>
           </a:p>
@@ -3704,6 +3710,814 @@
 </p:sld>
 </file>
 
+<file path=ppt/slides/slide2.xml><?xml version="1.0" encoding="utf-8"?>
+<p:sld xmlns:a="http://schemas.openxmlformats.org/drawingml/2006/main" xmlns:r="http://schemas.openxmlformats.org/officeDocument/2006/relationships" xmlns:p="http://schemas.openxmlformats.org/presentationml/2006/main">
+  <p:cSld>
+    <p:spTree>
+      <p:nvGrpSpPr>
+        <p:cNvPr id="1" name=""/>
+        <p:cNvGrpSpPr/>
+        <p:nvPr/>
+      </p:nvGrpSpPr>
+      <p:grpSpPr>
+        <a:xfrm>
+          <a:off x="0" y="0"/>
+          <a:ext cx="0" cy="0"/>
+          <a:chOff x="0" y="0"/>
+          <a:chExt cx="0" cy="0"/>
+        </a:xfrm>
+      </p:grpSpPr>
+      <p:sp>
+        <p:nvSpPr>
+          <p:cNvPr id="2" name="Rectangle: Rounded Corners 1">
+            <a:extLst>
+              <a:ext uri="{FF2B5EF4-FFF2-40B4-BE49-F238E27FC236}">
+                <a16:creationId xmlns:a16="http://schemas.microsoft.com/office/drawing/2014/main" id="{A491CF0A-9DE8-4A31-A46F-B24DD9D7EB36}"/>
+              </a:ext>
+            </a:extLst>
+          </p:cNvPr>
+          <p:cNvSpPr/>
+          <p:nvPr/>
+        </p:nvSpPr>
+        <p:spPr>
+          <a:xfrm>
+            <a:off x="562437" y="564789"/>
+            <a:ext cx="1463040" cy="914400"/>
+          </a:xfrm>
+          <a:prstGeom prst="roundRect">
+            <a:avLst/>
+          </a:prstGeom>
+        </p:spPr>
+        <p:style>
+          <a:lnRef idx="1">
+            <a:schemeClr val="accent4"/>
+          </a:lnRef>
+          <a:fillRef idx="2">
+            <a:schemeClr val="accent4"/>
+          </a:fillRef>
+          <a:effectRef idx="1">
+            <a:schemeClr val="accent4"/>
+          </a:effectRef>
+          <a:fontRef idx="minor">
+            <a:schemeClr val="dk1"/>
+          </a:fontRef>
+        </p:style>
+        <p:txBody>
+          <a:bodyPr rtlCol="0" anchor="t"/>
+          <a:lstStyle/>
+          <a:p>
+            <a:pPr algn="ctr"/>
+            <a:r>
+              <a:rPr lang="en-US" sz="1400" dirty="0"/>
+              <a:t>MainWindow</a:t>
+            </a:r>
+          </a:p>
+        </p:txBody>
+      </p:sp>
+      <p:sp>
+        <p:nvSpPr>
+          <p:cNvPr id="3" name="Rectangle: Rounded Corners 2">
+            <a:extLst>
+              <a:ext uri="{FF2B5EF4-FFF2-40B4-BE49-F238E27FC236}">
+                <a16:creationId xmlns:a16="http://schemas.microsoft.com/office/drawing/2014/main" id="{84F8A3C7-47BA-45BD-8636-5B7A47E43D7B}"/>
+              </a:ext>
+            </a:extLst>
+          </p:cNvPr>
+          <p:cNvSpPr/>
+          <p:nvPr/>
+        </p:nvSpPr>
+        <p:spPr>
+          <a:xfrm>
+            <a:off x="2578397" y="1963952"/>
+            <a:ext cx="1463040" cy="914400"/>
+          </a:xfrm>
+          <a:prstGeom prst="roundRect">
+            <a:avLst/>
+          </a:prstGeom>
+        </p:spPr>
+        <p:style>
+          <a:lnRef idx="1">
+            <a:schemeClr val="accent4"/>
+          </a:lnRef>
+          <a:fillRef idx="2">
+            <a:schemeClr val="accent4"/>
+          </a:fillRef>
+          <a:effectRef idx="1">
+            <a:schemeClr val="accent4"/>
+          </a:effectRef>
+          <a:fontRef idx="minor">
+            <a:schemeClr val="dk1"/>
+          </a:fontRef>
+        </p:style>
+        <p:txBody>
+          <a:bodyPr rtlCol="0" anchor="t"/>
+          <a:lstStyle/>
+          <a:p>
+            <a:pPr algn="ctr"/>
+            <a:r>
+              <a:rPr lang="en-US" sz="1400" dirty="0" err="1"/>
+              <a:t>MainTab</a:t>
+            </a:r>
+            <a:endParaRPr lang="en-US" sz="1400" dirty="0"/>
+          </a:p>
+        </p:txBody>
+      </p:sp>
+      <p:sp>
+        <p:nvSpPr>
+          <p:cNvPr id="4" name="Rectangle: Rounded Corners 3">
+            <a:extLst>
+              <a:ext uri="{FF2B5EF4-FFF2-40B4-BE49-F238E27FC236}">
+                <a16:creationId xmlns:a16="http://schemas.microsoft.com/office/drawing/2014/main" id="{FC2D10ED-00FC-4181-BA97-1F8B035B508C}"/>
+              </a:ext>
+            </a:extLst>
+          </p:cNvPr>
+          <p:cNvSpPr/>
+          <p:nvPr/>
+        </p:nvSpPr>
+        <p:spPr>
+          <a:xfrm>
+            <a:off x="562436" y="3429000"/>
+            <a:ext cx="1463040" cy="914400"/>
+          </a:xfrm>
+          <a:prstGeom prst="roundRect">
+            <a:avLst/>
+          </a:prstGeom>
+        </p:spPr>
+        <p:style>
+          <a:lnRef idx="1">
+            <a:schemeClr val="accent4"/>
+          </a:lnRef>
+          <a:fillRef idx="2">
+            <a:schemeClr val="accent4"/>
+          </a:fillRef>
+          <a:effectRef idx="1">
+            <a:schemeClr val="accent4"/>
+          </a:effectRef>
+          <a:fontRef idx="minor">
+            <a:schemeClr val="dk1"/>
+          </a:fontRef>
+        </p:style>
+        <p:txBody>
+          <a:bodyPr rtlCol="0" anchor="t"/>
+          <a:lstStyle/>
+          <a:p>
+            <a:pPr algn="ctr"/>
+            <a:r>
+              <a:rPr lang="en-US" sz="1400" dirty="0" err="1"/>
+              <a:t>MainCanvas</a:t>
+            </a:r>
+            <a:endParaRPr lang="en-US" sz="1400" dirty="0"/>
+          </a:p>
+        </p:txBody>
+      </p:sp>
+      <p:sp>
+        <p:nvSpPr>
+          <p:cNvPr id="9" name="Rectangle: Rounded Corners 8">
+            <a:extLst>
+              <a:ext uri="{FF2B5EF4-FFF2-40B4-BE49-F238E27FC236}">
+                <a16:creationId xmlns:a16="http://schemas.microsoft.com/office/drawing/2014/main" id="{20EB2104-6AC2-4E38-9D12-11F39CD694EA}"/>
+              </a:ext>
+            </a:extLst>
+          </p:cNvPr>
+          <p:cNvSpPr/>
+          <p:nvPr/>
+        </p:nvSpPr>
+        <p:spPr>
+          <a:xfrm>
+            <a:off x="4578351" y="4464411"/>
+            <a:ext cx="1463040" cy="914400"/>
+          </a:xfrm>
+          <a:prstGeom prst="roundRect">
+            <a:avLst/>
+          </a:prstGeom>
+          <a:solidFill>
+            <a:schemeClr val="accent5">
+              <a:lumMod val="40000"/>
+              <a:lumOff val="60000"/>
+            </a:schemeClr>
+          </a:solidFill>
+          <a:ln>
+            <a:solidFill>
+              <a:schemeClr val="accent1"/>
+            </a:solidFill>
+          </a:ln>
+        </p:spPr>
+        <p:style>
+          <a:lnRef idx="1">
+            <a:schemeClr val="accent4"/>
+          </a:lnRef>
+          <a:fillRef idx="2">
+            <a:schemeClr val="accent4"/>
+          </a:fillRef>
+          <a:effectRef idx="1">
+            <a:schemeClr val="accent4"/>
+          </a:effectRef>
+          <a:fontRef idx="minor">
+            <a:schemeClr val="dk1"/>
+          </a:fontRef>
+        </p:style>
+        <p:txBody>
+          <a:bodyPr rtlCol="0" anchor="t"/>
+          <a:lstStyle/>
+          <a:p>
+            <a:pPr algn="ctr"/>
+            <a:r>
+              <a:rPr lang="en-US" sz="1400" dirty="0" err="1"/>
+              <a:t>Prj</a:t>
+            </a:r>
+            <a:endParaRPr lang="en-US" sz="1400" dirty="0"/>
+          </a:p>
+        </p:txBody>
+      </p:sp>
+      <p:cxnSp>
+        <p:nvCxnSpPr>
+          <p:cNvPr id="14" name="Connector: Curved 13">
+            <a:extLst>
+              <a:ext uri="{FF2B5EF4-FFF2-40B4-BE49-F238E27FC236}">
+                <a16:creationId xmlns:a16="http://schemas.microsoft.com/office/drawing/2014/main" id="{3C52C1FF-5C7A-41E3-B13C-FF37CBC01207}"/>
+              </a:ext>
+            </a:extLst>
+          </p:cNvPr>
+          <p:cNvCxnSpPr>
+            <a:cxnSpLocks/>
+            <a:stCxn id="4" idx="0"/>
+            <a:endCxn id="2" idx="2"/>
+          </p:cNvCxnSpPr>
+          <p:nvPr/>
+        </p:nvCxnSpPr>
+        <p:spPr>
+          <a:xfrm rot="5400000" flipH="1" flipV="1">
+            <a:off x="319051" y="2454095"/>
+            <a:ext cx="1949811" cy="1"/>
+          </a:xfrm>
+          <a:prstGeom prst="curvedConnector3">
+            <a:avLst>
+              <a:gd name="adj1" fmla="val 50000"/>
+            </a:avLst>
+          </a:prstGeom>
+          <a:ln>
+            <a:prstDash val="lgDash"/>
+            <a:tailEnd type="triangle"/>
+          </a:ln>
+        </p:spPr>
+        <p:style>
+          <a:lnRef idx="1">
+            <a:schemeClr val="accent2"/>
+          </a:lnRef>
+          <a:fillRef idx="0">
+            <a:schemeClr val="accent2"/>
+          </a:fillRef>
+          <a:effectRef idx="0">
+            <a:schemeClr val="accent2"/>
+          </a:effectRef>
+          <a:fontRef idx="minor">
+            <a:schemeClr val="tx1"/>
+          </a:fontRef>
+        </p:style>
+      </p:cxnSp>
+      <p:cxnSp>
+        <p:nvCxnSpPr>
+          <p:cNvPr id="17" name="Connector: Curved 16">
+            <a:extLst>
+              <a:ext uri="{FF2B5EF4-FFF2-40B4-BE49-F238E27FC236}">
+                <a16:creationId xmlns:a16="http://schemas.microsoft.com/office/drawing/2014/main" id="{D7B40FFA-D09F-44D6-92E5-8E1AC9118BBE}"/>
+              </a:ext>
+            </a:extLst>
+          </p:cNvPr>
+          <p:cNvCxnSpPr>
+            <a:cxnSpLocks/>
+            <a:stCxn id="4" idx="2"/>
+            <a:endCxn id="9" idx="1"/>
+          </p:cNvCxnSpPr>
+          <p:nvPr/>
+        </p:nvCxnSpPr>
+        <p:spPr>
+          <a:xfrm rot="16200000" flipH="1">
+            <a:off x="2647048" y="2990307"/>
+            <a:ext cx="578211" cy="3284395"/>
+          </a:xfrm>
+          <a:prstGeom prst="curvedConnector2">
+            <a:avLst/>
+          </a:prstGeom>
+          <a:ln>
+            <a:prstDash val="lgDash"/>
+            <a:tailEnd type="triangle"/>
+          </a:ln>
+        </p:spPr>
+        <p:style>
+          <a:lnRef idx="1">
+            <a:schemeClr val="accent2"/>
+          </a:lnRef>
+          <a:fillRef idx="0">
+            <a:schemeClr val="accent2"/>
+          </a:fillRef>
+          <a:effectRef idx="0">
+            <a:schemeClr val="accent2"/>
+          </a:effectRef>
+          <a:fontRef idx="minor">
+            <a:schemeClr val="tx1"/>
+          </a:fontRef>
+        </p:style>
+      </p:cxnSp>
+      <p:cxnSp>
+        <p:nvCxnSpPr>
+          <p:cNvPr id="22" name="Connector: Curved 21">
+            <a:extLst>
+              <a:ext uri="{FF2B5EF4-FFF2-40B4-BE49-F238E27FC236}">
+                <a16:creationId xmlns:a16="http://schemas.microsoft.com/office/drawing/2014/main" id="{BF0B7550-950E-4672-96F7-B3C326966B0E}"/>
+              </a:ext>
+            </a:extLst>
+          </p:cNvPr>
+          <p:cNvCxnSpPr>
+            <a:cxnSpLocks/>
+            <a:stCxn id="3" idx="1"/>
+            <a:endCxn id="2" idx="2"/>
+          </p:cNvCxnSpPr>
+          <p:nvPr/>
+        </p:nvCxnSpPr>
+        <p:spPr>
+          <a:xfrm rot="10800000">
+            <a:off x="1293957" y="1479190"/>
+            <a:ext cx="1284440" cy="941963"/>
+          </a:xfrm>
+          <a:prstGeom prst="curvedConnector2">
+            <a:avLst/>
+          </a:prstGeom>
+          <a:ln>
+            <a:prstDash val="lgDash"/>
+            <a:tailEnd type="triangle"/>
+          </a:ln>
+        </p:spPr>
+        <p:style>
+          <a:lnRef idx="1">
+            <a:schemeClr val="accent2"/>
+          </a:lnRef>
+          <a:fillRef idx="0">
+            <a:schemeClr val="accent2"/>
+          </a:fillRef>
+          <a:effectRef idx="0">
+            <a:schemeClr val="accent2"/>
+          </a:effectRef>
+          <a:fontRef idx="minor">
+            <a:schemeClr val="tx1"/>
+          </a:fontRef>
+        </p:style>
+      </p:cxnSp>
+      <p:sp>
+        <p:nvSpPr>
+          <p:cNvPr id="25" name="Rectangle: Rounded Corners 24">
+            <a:extLst>
+              <a:ext uri="{FF2B5EF4-FFF2-40B4-BE49-F238E27FC236}">
+                <a16:creationId xmlns:a16="http://schemas.microsoft.com/office/drawing/2014/main" id="{DEC665A0-7E26-48CB-93BB-127BBCC146B1}"/>
+              </a:ext>
+            </a:extLst>
+          </p:cNvPr>
+          <p:cNvSpPr/>
+          <p:nvPr/>
+        </p:nvSpPr>
+        <p:spPr>
+          <a:xfrm>
+            <a:off x="4572000" y="564789"/>
+            <a:ext cx="1463040" cy="914400"/>
+          </a:xfrm>
+          <a:prstGeom prst="roundRect">
+            <a:avLst/>
+          </a:prstGeom>
+        </p:spPr>
+        <p:style>
+          <a:lnRef idx="1">
+            <a:schemeClr val="accent4"/>
+          </a:lnRef>
+          <a:fillRef idx="2">
+            <a:schemeClr val="accent4"/>
+          </a:fillRef>
+          <a:effectRef idx="1">
+            <a:schemeClr val="accent4"/>
+          </a:effectRef>
+          <a:fontRef idx="minor">
+            <a:schemeClr val="dk1"/>
+          </a:fontRef>
+        </p:style>
+        <p:txBody>
+          <a:bodyPr rtlCol="0" anchor="t"/>
+          <a:lstStyle/>
+          <a:p>
+            <a:pPr algn="ctr"/>
+            <a:r>
+              <a:rPr lang="en-US" sz="1400" dirty="0"/>
+              <a:t>Tool</a:t>
+            </a:r>
+          </a:p>
+        </p:txBody>
+      </p:sp>
+      <p:cxnSp>
+        <p:nvCxnSpPr>
+          <p:cNvPr id="30" name="Connector: Curved 29">
+            <a:extLst>
+              <a:ext uri="{FF2B5EF4-FFF2-40B4-BE49-F238E27FC236}">
+                <a16:creationId xmlns:a16="http://schemas.microsoft.com/office/drawing/2014/main" id="{C32AF792-2E08-4E6C-A339-6D21D1B466C3}"/>
+              </a:ext>
+            </a:extLst>
+          </p:cNvPr>
+          <p:cNvCxnSpPr>
+            <a:cxnSpLocks/>
+            <a:stCxn id="25" idx="0"/>
+            <a:endCxn id="2" idx="0"/>
+          </p:cNvCxnSpPr>
+          <p:nvPr/>
+        </p:nvCxnSpPr>
+        <p:spPr>
+          <a:xfrm rot="16200000" flipV="1">
+            <a:off x="3298739" y="-1439993"/>
+            <a:ext cx="12700" cy="4009563"/>
+          </a:xfrm>
+          <a:prstGeom prst="curvedConnector3">
+            <a:avLst>
+              <a:gd name="adj1" fmla="val 1800000"/>
+            </a:avLst>
+          </a:prstGeom>
+          <a:ln>
+            <a:prstDash val="lgDash"/>
+            <a:tailEnd type="triangle"/>
+          </a:ln>
+        </p:spPr>
+        <p:style>
+          <a:lnRef idx="1">
+            <a:schemeClr val="accent2"/>
+          </a:lnRef>
+          <a:fillRef idx="0">
+            <a:schemeClr val="accent2"/>
+          </a:fillRef>
+          <a:effectRef idx="0">
+            <a:schemeClr val="accent2"/>
+          </a:effectRef>
+          <a:fontRef idx="minor">
+            <a:schemeClr val="tx1"/>
+          </a:fontRef>
+        </p:style>
+      </p:cxnSp>
+      <p:cxnSp>
+        <p:nvCxnSpPr>
+          <p:cNvPr id="33" name="Connector: Curved 32">
+            <a:extLst>
+              <a:ext uri="{FF2B5EF4-FFF2-40B4-BE49-F238E27FC236}">
+                <a16:creationId xmlns:a16="http://schemas.microsoft.com/office/drawing/2014/main" id="{8BE0F1AA-5211-4D9A-99E1-D28F406B6B01}"/>
+              </a:ext>
+            </a:extLst>
+          </p:cNvPr>
+          <p:cNvCxnSpPr>
+            <a:cxnSpLocks/>
+            <a:stCxn id="25" idx="2"/>
+            <a:endCxn id="9" idx="0"/>
+          </p:cNvCxnSpPr>
+          <p:nvPr/>
+        </p:nvCxnSpPr>
+        <p:spPr>
+          <a:xfrm rot="16200000" flipH="1">
+            <a:off x="3814084" y="2968624"/>
+            <a:ext cx="2985222" cy="6351"/>
+          </a:xfrm>
+          <a:prstGeom prst="curvedConnector3">
+            <a:avLst>
+              <a:gd name="adj1" fmla="val 50000"/>
+            </a:avLst>
+          </a:prstGeom>
+          <a:ln>
+            <a:prstDash val="lgDash"/>
+            <a:tailEnd type="triangle"/>
+          </a:ln>
+        </p:spPr>
+        <p:style>
+          <a:lnRef idx="1">
+            <a:schemeClr val="accent2"/>
+          </a:lnRef>
+          <a:fillRef idx="0">
+            <a:schemeClr val="accent2"/>
+          </a:fillRef>
+          <a:effectRef idx="0">
+            <a:schemeClr val="accent2"/>
+          </a:effectRef>
+          <a:fontRef idx="minor">
+            <a:schemeClr val="tx1"/>
+          </a:fontRef>
+        </p:style>
+      </p:cxnSp>
+      <p:cxnSp>
+        <p:nvCxnSpPr>
+          <p:cNvPr id="27" name="Connector: Curved 26">
+            <a:extLst>
+              <a:ext uri="{FF2B5EF4-FFF2-40B4-BE49-F238E27FC236}">
+                <a16:creationId xmlns:a16="http://schemas.microsoft.com/office/drawing/2014/main" id="{D97AA17B-1A4B-46AB-8BC1-9A8418EAB8E0}"/>
+              </a:ext>
+            </a:extLst>
+          </p:cNvPr>
+          <p:cNvCxnSpPr>
+            <a:cxnSpLocks/>
+            <a:stCxn id="3" idx="0"/>
+            <a:endCxn id="25" idx="1"/>
+          </p:cNvCxnSpPr>
+          <p:nvPr/>
+        </p:nvCxnSpPr>
+        <p:spPr>
+          <a:xfrm rot="5400000" flipH="1" flipV="1">
+            <a:off x="3469977" y="861930"/>
+            <a:ext cx="941963" cy="1262083"/>
+          </a:xfrm>
+          <a:prstGeom prst="curvedConnector2">
+            <a:avLst/>
+          </a:prstGeom>
+          <a:ln>
+            <a:tailEnd type="triangle"/>
+          </a:ln>
+        </p:spPr>
+        <p:style>
+          <a:lnRef idx="1">
+            <a:schemeClr val="accent1"/>
+          </a:lnRef>
+          <a:fillRef idx="0">
+            <a:schemeClr val="accent1"/>
+          </a:fillRef>
+          <a:effectRef idx="0">
+            <a:schemeClr val="accent1"/>
+          </a:effectRef>
+          <a:fontRef idx="minor">
+            <a:schemeClr val="tx1"/>
+          </a:fontRef>
+        </p:style>
+      </p:cxnSp>
+      <p:cxnSp>
+        <p:nvCxnSpPr>
+          <p:cNvPr id="8" name="Connector: Curved 7">
+            <a:extLst>
+              <a:ext uri="{FF2B5EF4-FFF2-40B4-BE49-F238E27FC236}">
+                <a16:creationId xmlns:a16="http://schemas.microsoft.com/office/drawing/2014/main" id="{523D4C6D-D888-4595-8E97-0DBB83C57A9F}"/>
+              </a:ext>
+            </a:extLst>
+          </p:cNvPr>
+          <p:cNvCxnSpPr>
+            <a:cxnSpLocks/>
+            <a:stCxn id="3" idx="1"/>
+            <a:endCxn id="4" idx="0"/>
+          </p:cNvCxnSpPr>
+          <p:nvPr/>
+        </p:nvCxnSpPr>
+        <p:spPr>
+          <a:xfrm rot="10800000" flipV="1">
+            <a:off x="1293957" y="2421152"/>
+            <a:ext cx="1284441" cy="1007848"/>
+          </a:xfrm>
+          <a:prstGeom prst="curvedConnector2">
+            <a:avLst/>
+          </a:prstGeom>
+          <a:ln>
+            <a:tailEnd type="triangle"/>
+          </a:ln>
+        </p:spPr>
+        <p:style>
+          <a:lnRef idx="1">
+            <a:schemeClr val="accent1"/>
+          </a:lnRef>
+          <a:fillRef idx="0">
+            <a:schemeClr val="accent1"/>
+          </a:fillRef>
+          <a:effectRef idx="0">
+            <a:schemeClr val="accent1"/>
+          </a:effectRef>
+          <a:fontRef idx="minor">
+            <a:schemeClr val="tx1"/>
+          </a:fontRef>
+        </p:style>
+      </p:cxnSp>
+      <p:cxnSp>
+        <p:nvCxnSpPr>
+          <p:cNvPr id="36" name="Connector: Curved 35">
+            <a:extLst>
+              <a:ext uri="{FF2B5EF4-FFF2-40B4-BE49-F238E27FC236}">
+                <a16:creationId xmlns:a16="http://schemas.microsoft.com/office/drawing/2014/main" id="{A24819CA-11AF-42E2-9251-AF0E7FC10B8E}"/>
+              </a:ext>
+            </a:extLst>
+          </p:cNvPr>
+          <p:cNvCxnSpPr>
+            <a:cxnSpLocks/>
+            <a:stCxn id="25" idx="2"/>
+            <a:endCxn id="4" idx="3"/>
+          </p:cNvCxnSpPr>
+          <p:nvPr/>
+        </p:nvCxnSpPr>
+        <p:spPr>
+          <a:xfrm rot="5400000">
+            <a:off x="2460993" y="1043672"/>
+            <a:ext cx="2407011" cy="3278044"/>
+          </a:xfrm>
+          <a:prstGeom prst="curvedConnector2">
+            <a:avLst/>
+          </a:prstGeom>
+          <a:ln>
+            <a:prstDash val="lgDash"/>
+            <a:tailEnd type="triangle"/>
+          </a:ln>
+        </p:spPr>
+        <p:style>
+          <a:lnRef idx="1">
+            <a:schemeClr val="accent2"/>
+          </a:lnRef>
+          <a:fillRef idx="0">
+            <a:schemeClr val="accent2"/>
+          </a:fillRef>
+          <a:effectRef idx="0">
+            <a:schemeClr val="accent2"/>
+          </a:effectRef>
+          <a:fontRef idx="minor">
+            <a:schemeClr val="tx1"/>
+          </a:fontRef>
+        </p:style>
+      </p:cxnSp>
+      <p:cxnSp>
+        <p:nvCxnSpPr>
+          <p:cNvPr id="41" name="Connector: Curved 40">
+            <a:extLst>
+              <a:ext uri="{FF2B5EF4-FFF2-40B4-BE49-F238E27FC236}">
+                <a16:creationId xmlns:a16="http://schemas.microsoft.com/office/drawing/2014/main" id="{FA353C40-B908-4FCB-8D5C-0903BC80C380}"/>
+              </a:ext>
+            </a:extLst>
+          </p:cNvPr>
+          <p:cNvCxnSpPr>
+            <a:cxnSpLocks/>
+            <a:stCxn id="25" idx="2"/>
+            <a:endCxn id="3" idx="3"/>
+          </p:cNvCxnSpPr>
+          <p:nvPr/>
+        </p:nvCxnSpPr>
+        <p:spPr>
+          <a:xfrm rot="5400000">
+            <a:off x="4201498" y="1319129"/>
+            <a:ext cx="941963" cy="1262083"/>
+          </a:xfrm>
+          <a:prstGeom prst="curvedConnector2">
+            <a:avLst/>
+          </a:prstGeom>
+          <a:ln>
+            <a:prstDash val="lgDash"/>
+            <a:tailEnd type="triangle"/>
+          </a:ln>
+        </p:spPr>
+        <p:style>
+          <a:lnRef idx="1">
+            <a:schemeClr val="accent2"/>
+          </a:lnRef>
+          <a:fillRef idx="0">
+            <a:schemeClr val="accent2"/>
+          </a:fillRef>
+          <a:effectRef idx="0">
+            <a:schemeClr val="accent2"/>
+          </a:effectRef>
+          <a:fontRef idx="minor">
+            <a:schemeClr val="tx1"/>
+          </a:fontRef>
+        </p:style>
+      </p:cxnSp>
+      <p:cxnSp>
+        <p:nvCxnSpPr>
+          <p:cNvPr id="6" name="Connector: Curved 5">
+            <a:extLst>
+              <a:ext uri="{FF2B5EF4-FFF2-40B4-BE49-F238E27FC236}">
+                <a16:creationId xmlns:a16="http://schemas.microsoft.com/office/drawing/2014/main" id="{D8D557B7-13B4-4B9F-AADF-2F048F5001A1}"/>
+              </a:ext>
+            </a:extLst>
+          </p:cNvPr>
+          <p:cNvCxnSpPr>
+            <a:stCxn id="2" idx="3"/>
+            <a:endCxn id="3" idx="0"/>
+          </p:cNvCxnSpPr>
+          <p:nvPr/>
+        </p:nvCxnSpPr>
+        <p:spPr>
+          <a:xfrm>
+            <a:off x="2025477" y="1021989"/>
+            <a:ext cx="1284440" cy="941963"/>
+          </a:xfrm>
+          <a:prstGeom prst="curvedConnector2">
+            <a:avLst/>
+          </a:prstGeom>
+          <a:ln>
+            <a:tailEnd type="triangle"/>
+          </a:ln>
+        </p:spPr>
+        <p:style>
+          <a:lnRef idx="1">
+            <a:schemeClr val="accent1"/>
+          </a:lnRef>
+          <a:fillRef idx="0">
+            <a:schemeClr val="accent1"/>
+          </a:fillRef>
+          <a:effectRef idx="0">
+            <a:schemeClr val="accent1"/>
+          </a:effectRef>
+          <a:fontRef idx="minor">
+            <a:schemeClr val="tx1"/>
+          </a:fontRef>
+        </p:style>
+      </p:cxnSp>
+      <p:cxnSp>
+        <p:nvCxnSpPr>
+          <p:cNvPr id="13" name="Connector: Curved 12">
+            <a:extLst>
+              <a:ext uri="{FF2B5EF4-FFF2-40B4-BE49-F238E27FC236}">
+                <a16:creationId xmlns:a16="http://schemas.microsoft.com/office/drawing/2014/main" id="{CDA5C4C2-3F14-4AC9-BDF9-A44F97D6EC0F}"/>
+              </a:ext>
+            </a:extLst>
+          </p:cNvPr>
+          <p:cNvCxnSpPr>
+            <a:cxnSpLocks/>
+            <a:stCxn id="4" idx="3"/>
+            <a:endCxn id="3" idx="2"/>
+          </p:cNvCxnSpPr>
+          <p:nvPr/>
+        </p:nvCxnSpPr>
+        <p:spPr>
+          <a:xfrm flipV="1">
+            <a:off x="2025476" y="2878352"/>
+            <a:ext cx="1284441" cy="1007848"/>
+          </a:xfrm>
+          <a:prstGeom prst="curvedConnector2">
+            <a:avLst/>
+          </a:prstGeom>
+          <a:ln>
+            <a:prstDash val="lgDash"/>
+            <a:tailEnd type="triangle"/>
+          </a:ln>
+        </p:spPr>
+        <p:style>
+          <a:lnRef idx="1">
+            <a:schemeClr val="accent2"/>
+          </a:lnRef>
+          <a:fillRef idx="0">
+            <a:schemeClr val="accent2"/>
+          </a:fillRef>
+          <a:effectRef idx="0">
+            <a:schemeClr val="accent2"/>
+          </a:effectRef>
+          <a:fontRef idx="minor">
+            <a:schemeClr val="tx1"/>
+          </a:fontRef>
+        </p:style>
+      </p:cxnSp>
+      <p:cxnSp>
+        <p:nvCxnSpPr>
+          <p:cNvPr id="11" name="Connector: Curved 10">
+            <a:extLst>
+              <a:ext uri="{FF2B5EF4-FFF2-40B4-BE49-F238E27FC236}">
+                <a16:creationId xmlns:a16="http://schemas.microsoft.com/office/drawing/2014/main" id="{8FCD5178-C631-45D6-83A1-A2E363C447A7}"/>
+              </a:ext>
+            </a:extLst>
+          </p:cNvPr>
+          <p:cNvCxnSpPr>
+            <a:cxnSpLocks/>
+            <a:stCxn id="3" idx="3"/>
+            <a:endCxn id="9" idx="0"/>
+          </p:cNvCxnSpPr>
+          <p:nvPr/>
+        </p:nvCxnSpPr>
+        <p:spPr>
+          <a:xfrm>
+            <a:off x="4041437" y="2421152"/>
+            <a:ext cx="1268434" cy="2043259"/>
+          </a:xfrm>
+          <a:prstGeom prst="curvedConnector2">
+            <a:avLst/>
+          </a:prstGeom>
+          <a:ln>
+            <a:tailEnd type="triangle"/>
+          </a:ln>
+        </p:spPr>
+        <p:style>
+          <a:lnRef idx="1">
+            <a:schemeClr val="accent1"/>
+          </a:lnRef>
+          <a:fillRef idx="0">
+            <a:schemeClr val="accent1"/>
+          </a:fillRef>
+          <a:effectRef idx="0">
+            <a:schemeClr val="accent1"/>
+          </a:effectRef>
+          <a:fontRef idx="minor">
+            <a:schemeClr val="tx1"/>
+          </a:fontRef>
+        </p:style>
+      </p:cxnSp>
+    </p:spTree>
+    <p:extLst>
+      <p:ext uri="{BB962C8B-B14F-4D97-AF65-F5344CB8AC3E}">
+        <p14:creationId xmlns:p14="http://schemas.microsoft.com/office/powerpoint/2010/main" val="2718867356"/>
+      </p:ext>
+    </p:extLst>
+  </p:cSld>
+  <p:clrMapOvr>
+    <a:masterClrMapping/>
+  </p:clrMapOvr>
+</p:sld>
+</file>
+
 <file path=ppt/theme/theme1.xml><?xml version="1.0" encoding="utf-8"?>
 <a:theme xmlns:a="http://schemas.openxmlformats.org/drawingml/2006/main" name="Office Theme">
   <a:themeElements>

</xml_diff>

<commit_message>
minor changes to images
</commit_message>
<xml_diff>
--- a/resources/images.pptx
+++ b/resources/images.pptx
@@ -260,7 +260,7 @@
           <a:p>
             <a:fld id="{21B00427-3F2A-4FF0-A50F-39B79BD1214F}" type="datetimeFigureOut">
               <a:rPr lang="en-US" smtClean="0"/>
-              <a:t>3/5/2019</a:t>
+              <a:t>3/16/2019</a:t>
             </a:fld>
             <a:endParaRPr lang="en-US"/>
           </a:p>
@@ -458,7 +458,7 @@
           <a:p>
             <a:fld id="{21B00427-3F2A-4FF0-A50F-39B79BD1214F}" type="datetimeFigureOut">
               <a:rPr lang="en-US" smtClean="0"/>
-              <a:t>3/5/2019</a:t>
+              <a:t>3/16/2019</a:t>
             </a:fld>
             <a:endParaRPr lang="en-US"/>
           </a:p>
@@ -666,7 +666,7 @@
           <a:p>
             <a:fld id="{21B00427-3F2A-4FF0-A50F-39B79BD1214F}" type="datetimeFigureOut">
               <a:rPr lang="en-US" smtClean="0"/>
-              <a:t>3/5/2019</a:t>
+              <a:t>3/16/2019</a:t>
             </a:fld>
             <a:endParaRPr lang="en-US"/>
           </a:p>
@@ -864,7 +864,7 @@
           <a:p>
             <a:fld id="{21B00427-3F2A-4FF0-A50F-39B79BD1214F}" type="datetimeFigureOut">
               <a:rPr lang="en-US" smtClean="0"/>
-              <a:t>3/5/2019</a:t>
+              <a:t>3/16/2019</a:t>
             </a:fld>
             <a:endParaRPr lang="en-US"/>
           </a:p>
@@ -1139,7 +1139,7 @@
           <a:p>
             <a:fld id="{21B00427-3F2A-4FF0-A50F-39B79BD1214F}" type="datetimeFigureOut">
               <a:rPr lang="en-US" smtClean="0"/>
-              <a:t>3/5/2019</a:t>
+              <a:t>3/16/2019</a:t>
             </a:fld>
             <a:endParaRPr lang="en-US"/>
           </a:p>
@@ -1404,7 +1404,7 @@
           <a:p>
             <a:fld id="{21B00427-3F2A-4FF0-A50F-39B79BD1214F}" type="datetimeFigureOut">
               <a:rPr lang="en-US" smtClean="0"/>
-              <a:t>3/5/2019</a:t>
+              <a:t>3/16/2019</a:t>
             </a:fld>
             <a:endParaRPr lang="en-US"/>
           </a:p>
@@ -1816,7 +1816,7 @@
           <a:p>
             <a:fld id="{21B00427-3F2A-4FF0-A50F-39B79BD1214F}" type="datetimeFigureOut">
               <a:rPr lang="en-US" smtClean="0"/>
-              <a:t>3/5/2019</a:t>
+              <a:t>3/16/2019</a:t>
             </a:fld>
             <a:endParaRPr lang="en-US"/>
           </a:p>
@@ -1957,7 +1957,7 @@
           <a:p>
             <a:fld id="{21B00427-3F2A-4FF0-A50F-39B79BD1214F}" type="datetimeFigureOut">
               <a:rPr lang="en-US" smtClean="0"/>
-              <a:t>3/5/2019</a:t>
+              <a:t>3/16/2019</a:t>
             </a:fld>
             <a:endParaRPr lang="en-US"/>
           </a:p>
@@ -2070,7 +2070,7 @@
           <a:p>
             <a:fld id="{21B00427-3F2A-4FF0-A50F-39B79BD1214F}" type="datetimeFigureOut">
               <a:rPr lang="en-US" smtClean="0"/>
-              <a:t>3/5/2019</a:t>
+              <a:t>3/16/2019</a:t>
             </a:fld>
             <a:endParaRPr lang="en-US"/>
           </a:p>
@@ -2381,7 +2381,7 @@
           <a:p>
             <a:fld id="{21B00427-3F2A-4FF0-A50F-39B79BD1214F}" type="datetimeFigureOut">
               <a:rPr lang="en-US" smtClean="0"/>
-              <a:t>3/5/2019</a:t>
+              <a:t>3/16/2019</a:t>
             </a:fld>
             <a:endParaRPr lang="en-US"/>
           </a:p>
@@ -2669,7 +2669,7 @@
           <a:p>
             <a:fld id="{21B00427-3F2A-4FF0-A50F-39B79BD1214F}" type="datetimeFigureOut">
               <a:rPr lang="en-US" smtClean="0"/>
-              <a:t>3/5/2019</a:t>
+              <a:t>3/16/2019</a:t>
             </a:fld>
             <a:endParaRPr lang="en-US"/>
           </a:p>
@@ -2910,7 +2910,7 @@
           <a:p>
             <a:fld id="{21B00427-3F2A-4FF0-A50F-39B79BD1214F}" type="datetimeFigureOut">
               <a:rPr lang="en-US" smtClean="0"/>
-              <a:t>3/5/2019</a:t>
+              <a:t>3/16/2019</a:t>
             </a:fld>
             <a:endParaRPr lang="en-US"/>
           </a:p>
@@ -4505,6 +4505,122 @@
           </a:fontRef>
         </p:style>
       </p:cxnSp>
+      <p:sp>
+        <p:nvSpPr>
+          <p:cNvPr id="19" name="Rectangle: Rounded Corners 18">
+            <a:extLst>
+              <a:ext uri="{FF2B5EF4-FFF2-40B4-BE49-F238E27FC236}">
+                <a16:creationId xmlns:a16="http://schemas.microsoft.com/office/drawing/2014/main" id="{1DAD71CA-265B-41BB-98F9-FC917631B2B6}"/>
+              </a:ext>
+            </a:extLst>
+          </p:cNvPr>
+          <p:cNvSpPr/>
+          <p:nvPr/>
+        </p:nvSpPr>
+        <p:spPr>
+          <a:xfrm>
+            <a:off x="6766560" y="3534818"/>
+            <a:ext cx="1463040" cy="914400"/>
+          </a:xfrm>
+          <a:prstGeom prst="roundRect">
+            <a:avLst/>
+          </a:prstGeom>
+          <a:solidFill>
+            <a:schemeClr val="accent5">
+              <a:lumMod val="40000"/>
+              <a:lumOff val="60000"/>
+            </a:schemeClr>
+          </a:solidFill>
+          <a:ln>
+            <a:solidFill>
+              <a:schemeClr val="accent1"/>
+            </a:solidFill>
+          </a:ln>
+        </p:spPr>
+        <p:style>
+          <a:lnRef idx="1">
+            <a:schemeClr val="accent4"/>
+          </a:lnRef>
+          <a:fillRef idx="2">
+            <a:schemeClr val="accent4"/>
+          </a:fillRef>
+          <a:effectRef idx="1">
+            <a:schemeClr val="accent4"/>
+          </a:effectRef>
+          <a:fontRef idx="minor">
+            <a:schemeClr val="dk1"/>
+          </a:fontRef>
+        </p:style>
+        <p:txBody>
+          <a:bodyPr rtlCol="0" anchor="t"/>
+          <a:lstStyle/>
+          <a:p>
+            <a:pPr algn="ctr"/>
+            <a:r>
+              <a:rPr lang="en-US" sz="1400" dirty="0"/>
+              <a:t>Product</a:t>
+            </a:r>
+          </a:p>
+        </p:txBody>
+      </p:sp>
+      <p:sp>
+        <p:nvSpPr>
+          <p:cNvPr id="20" name="Rectangle: Rounded Corners 19">
+            <a:extLst>
+              <a:ext uri="{FF2B5EF4-FFF2-40B4-BE49-F238E27FC236}">
+                <a16:creationId xmlns:a16="http://schemas.microsoft.com/office/drawing/2014/main" id="{CA046334-99BA-4E17-BECB-45F309BC480F}"/>
+              </a:ext>
+            </a:extLst>
+          </p:cNvPr>
+          <p:cNvSpPr/>
+          <p:nvPr/>
+        </p:nvSpPr>
+        <p:spPr>
+          <a:xfrm>
+            <a:off x="6766560" y="5129764"/>
+            <a:ext cx="1463040" cy="914400"/>
+          </a:xfrm>
+          <a:prstGeom prst="roundRect">
+            <a:avLst/>
+          </a:prstGeom>
+          <a:solidFill>
+            <a:schemeClr val="accent5">
+              <a:lumMod val="40000"/>
+              <a:lumOff val="60000"/>
+            </a:schemeClr>
+          </a:solidFill>
+          <a:ln>
+            <a:solidFill>
+              <a:schemeClr val="accent1"/>
+            </a:solidFill>
+          </a:ln>
+        </p:spPr>
+        <p:style>
+          <a:lnRef idx="1">
+            <a:schemeClr val="accent4"/>
+          </a:lnRef>
+          <a:fillRef idx="2">
+            <a:schemeClr val="accent4"/>
+          </a:fillRef>
+          <a:effectRef idx="1">
+            <a:schemeClr val="accent4"/>
+          </a:effectRef>
+          <a:fontRef idx="minor">
+            <a:schemeClr val="dk1"/>
+          </a:fontRef>
+        </p:style>
+        <p:txBody>
+          <a:bodyPr rtlCol="0" anchor="t"/>
+          <a:lstStyle/>
+          <a:p>
+            <a:pPr algn="ctr"/>
+            <a:r>
+              <a:rPr lang="en-US" sz="1400" dirty="0"/>
+              <a:t>Raw</a:t>
+            </a:r>
+          </a:p>
+        </p:txBody>
+      </p:sp>
     </p:spTree>
     <p:extLst>
       <p:ext uri="{BB962C8B-B14F-4D97-AF65-F5344CB8AC3E}">

</xml_diff>